<commit_message>
add description of the geology scenarios
</commit_message>
<xml_diff>
--- a/GeologyScenarioForTesting.pptx
+++ b/GeologyScenarioForTesting.pptx
@@ -243,7 +243,7 @@
           <a:p>
             <a:fld id="{F3F0FDFC-A3F0-49EF-9F9E-7E3065794AD8}" type="datetimeFigureOut">
               <a:rPr lang="en-US" smtClean="0"/>
-              <a:t>3/25/2019</a:t>
+              <a:t>3/27/2019</a:t>
             </a:fld>
             <a:endParaRPr lang="en-US"/>
           </a:p>
@@ -413,7 +413,7 @@
           <a:p>
             <a:fld id="{F3F0FDFC-A3F0-49EF-9F9E-7E3065794AD8}" type="datetimeFigureOut">
               <a:rPr lang="en-US" smtClean="0"/>
-              <a:t>3/25/2019</a:t>
+              <a:t>3/27/2019</a:t>
             </a:fld>
             <a:endParaRPr lang="en-US"/>
           </a:p>
@@ -593,7 +593,7 @@
           <a:p>
             <a:fld id="{F3F0FDFC-A3F0-49EF-9F9E-7E3065794AD8}" type="datetimeFigureOut">
               <a:rPr lang="en-US" smtClean="0"/>
-              <a:t>3/25/2019</a:t>
+              <a:t>3/27/2019</a:t>
             </a:fld>
             <a:endParaRPr lang="en-US"/>
           </a:p>
@@ -763,7 +763,7 @@
           <a:p>
             <a:fld id="{F3F0FDFC-A3F0-49EF-9F9E-7E3065794AD8}" type="datetimeFigureOut">
               <a:rPr lang="en-US" smtClean="0"/>
-              <a:t>3/25/2019</a:t>
+              <a:t>3/27/2019</a:t>
             </a:fld>
             <a:endParaRPr lang="en-US"/>
           </a:p>
@@ -1007,7 +1007,7 @@
           <a:p>
             <a:fld id="{F3F0FDFC-A3F0-49EF-9F9E-7E3065794AD8}" type="datetimeFigureOut">
               <a:rPr lang="en-US" smtClean="0"/>
-              <a:t>3/25/2019</a:t>
+              <a:t>3/27/2019</a:t>
             </a:fld>
             <a:endParaRPr lang="en-US"/>
           </a:p>
@@ -1239,7 +1239,7 @@
           <a:p>
             <a:fld id="{F3F0FDFC-A3F0-49EF-9F9E-7E3065794AD8}" type="datetimeFigureOut">
               <a:rPr lang="en-US" smtClean="0"/>
-              <a:t>3/25/2019</a:t>
+              <a:t>3/27/2019</a:t>
             </a:fld>
             <a:endParaRPr lang="en-US"/>
           </a:p>
@@ -1606,7 +1606,7 @@
           <a:p>
             <a:fld id="{F3F0FDFC-A3F0-49EF-9F9E-7E3065794AD8}" type="datetimeFigureOut">
               <a:rPr lang="en-US" smtClean="0"/>
-              <a:t>3/25/2019</a:t>
+              <a:t>3/27/2019</a:t>
             </a:fld>
             <a:endParaRPr lang="en-US"/>
           </a:p>
@@ -1724,7 +1724,7 @@
           <a:p>
             <a:fld id="{F3F0FDFC-A3F0-49EF-9F9E-7E3065794AD8}" type="datetimeFigureOut">
               <a:rPr lang="en-US" smtClean="0"/>
-              <a:t>3/25/2019</a:t>
+              <a:t>3/27/2019</a:t>
             </a:fld>
             <a:endParaRPr lang="en-US"/>
           </a:p>
@@ -1819,7 +1819,7 @@
           <a:p>
             <a:fld id="{F3F0FDFC-A3F0-49EF-9F9E-7E3065794AD8}" type="datetimeFigureOut">
               <a:rPr lang="en-US" smtClean="0"/>
-              <a:t>3/25/2019</a:t>
+              <a:t>3/27/2019</a:t>
             </a:fld>
             <a:endParaRPr lang="en-US"/>
           </a:p>
@@ -2096,7 +2096,7 @@
           <a:p>
             <a:fld id="{F3F0FDFC-A3F0-49EF-9F9E-7E3065794AD8}" type="datetimeFigureOut">
               <a:rPr lang="en-US" smtClean="0"/>
-              <a:t>3/25/2019</a:t>
+              <a:t>3/27/2019</a:t>
             </a:fld>
             <a:endParaRPr lang="en-US"/>
           </a:p>
@@ -2353,7 +2353,7 @@
           <a:p>
             <a:fld id="{F3F0FDFC-A3F0-49EF-9F9E-7E3065794AD8}" type="datetimeFigureOut">
               <a:rPr lang="en-US" smtClean="0"/>
-              <a:t>3/25/2019</a:t>
+              <a:t>3/27/2019</a:t>
             </a:fld>
             <a:endParaRPr lang="en-US"/>
           </a:p>
@@ -2566,7 +2566,7 @@
           <a:p>
             <a:fld id="{F3F0FDFC-A3F0-49EF-9F9E-7E3065794AD8}" type="datetimeFigureOut">
               <a:rPr lang="en-US" smtClean="0"/>
-              <a:t>3/25/2019</a:t>
+              <a:t>3/27/2019</a:t>
             </a:fld>
             <a:endParaRPr lang="en-US"/>
           </a:p>
@@ -2979,7 +2979,7 @@
         </p:nvGrpSpPr>
         <p:grpSpPr>
           <a:xfrm>
-            <a:off x="819582" y="847491"/>
+            <a:off x="585406" y="156116"/>
             <a:ext cx="8527618" cy="5269550"/>
             <a:chOff x="1056649" y="1169224"/>
             <a:chExt cx="7589727" cy="4689990"/>
@@ -3114,7 +3114,6 @@
                 <a:rPr lang="en-US" sz="1485" dirty="0"/>
                 <a:t>-Silurian</a:t>
               </a:r>
-              <a:endParaRPr lang="en-US" sz="1485" dirty="0"/>
             </a:p>
           </p:txBody>
         </p:sp>
@@ -3294,7 +3293,6 @@
                 <a:rPr lang="en-US" sz="1485" dirty="0"/>
                 <a:t>-Ordovician</a:t>
               </a:r>
-              <a:endParaRPr lang="en-US" sz="1485" dirty="0"/>
             </a:p>
           </p:txBody>
         </p:sp>
@@ -3431,7 +3429,6 @@
                 <a:rPr lang="en-US" sz="1485" dirty="0"/>
                 <a:t>Bolsa Quartzite</a:t>
               </a:r>
-              <a:endParaRPr lang="en-US" sz="1485" dirty="0"/>
             </a:p>
           </p:txBody>
         </p:sp>
@@ -3630,11 +3627,6 @@
                 </a:rPr>
                 <a:t>- Jurassic</a:t>
               </a:r>
-              <a:endParaRPr lang="en-US" sz="1485" dirty="0">
-                <a:solidFill>
-                  <a:schemeClr val="tx1"/>
-                </a:solidFill>
-              </a:endParaRPr>
             </a:p>
           </p:txBody>
         </p:sp>
@@ -5803,11 +5795,6 @@
                 </a:rPr>
                 <a:t>intrusion     </a:t>
               </a:r>
-              <a:endParaRPr lang="en-US" sz="1485" dirty="0">
-                <a:solidFill>
-                  <a:srgbClr val="7030A0"/>
-                </a:solidFill>
-              </a:endParaRPr>
             </a:p>
           </p:txBody>
         </p:sp>
@@ -6055,7 +6042,6 @@
                 <a:rPr lang="en-US" sz="1485" dirty="0"/>
                 <a:t>-Dike</a:t>
               </a:r>
-              <a:endParaRPr lang="en-US" sz="1485" dirty="0"/>
             </a:p>
           </p:txBody>
         </p:sp>
@@ -6272,11 +6258,6 @@
                 </a:rPr>
                 <a:t>-Late Miocene</a:t>
               </a:r>
-              <a:endParaRPr lang="en-US" sz="1485" dirty="0">
-                <a:solidFill>
-                  <a:schemeClr val="tx1"/>
-                </a:solidFill>
-              </a:endParaRPr>
             </a:p>
           </p:txBody>
         </p:sp>
@@ -6526,7 +6507,6 @@
                 <a:rPr lang="en-US" sz="1485" dirty="0"/>
                 <a:t>unconformity</a:t>
               </a:r>
-              <a:endParaRPr lang="en-US" sz="1485" dirty="0"/>
             </a:p>
           </p:txBody>
         </p:sp>
@@ -6560,7 +6540,6 @@
                 <a:rPr lang="en-US" sz="1485" dirty="0"/>
                 <a:t> Marker bed</a:t>
               </a:r>
-              <a:endParaRPr lang="en-US" sz="1485" dirty="0"/>
             </a:p>
           </p:txBody>
         </p:sp>
@@ -6614,11 +6593,6 @@
                 </a:rPr>
                 <a:t>Hs-Holocene</a:t>
               </a:r>
-              <a:endParaRPr lang="en-US" sz="1485" dirty="0">
-                <a:solidFill>
-                  <a:schemeClr val="tx1"/>
-                </a:solidFill>
-              </a:endParaRPr>
             </a:p>
           </p:txBody>
         </p:sp>
@@ -6648,7 +6622,6 @@
                 <a:rPr lang="en-US" sz="1485" dirty="0"/>
                 <a:t>disconformity</a:t>
               </a:r>
-              <a:endParaRPr lang="en-US" sz="1485" dirty="0"/>
             </a:p>
           </p:txBody>
         </p:sp>
@@ -6678,7 +6651,6 @@
                 <a:rPr lang="en-US" sz="1485" dirty="0"/>
                 <a:t>Angular unconformity</a:t>
               </a:r>
-              <a:endParaRPr lang="en-US" sz="1485" dirty="0"/>
             </a:p>
           </p:txBody>
         </p:sp>
@@ -6718,7 +6690,6 @@
                 <a:rPr lang="en-US" sz="1485" dirty="0"/>
                 <a:t> Metamorphic rocks</a:t>
               </a:r>
-              <a:endParaRPr lang="en-US" sz="1485" dirty="0"/>
             </a:p>
           </p:txBody>
         </p:sp>
@@ -6748,7 +6719,6 @@
                 <a:rPr lang="en-US" sz="825" dirty="0"/>
                 <a:t>unconformity</a:t>
               </a:r>
-              <a:endParaRPr lang="en-US" sz="825" dirty="0"/>
             </a:p>
           </p:txBody>
         </p:sp>
@@ -6778,7 +6748,6 @@
                 <a:rPr lang="en-US" sz="825" dirty="0"/>
                 <a:t>conformable</a:t>
               </a:r>
-              <a:endParaRPr lang="en-US" sz="825" dirty="0"/>
             </a:p>
           </p:txBody>
         </p:sp>
@@ -6890,7 +6859,6 @@
                 <a:rPr lang="en-US" sz="2310" b="1" dirty="0"/>
                 <a:t>1</a:t>
               </a:r>
-              <a:endParaRPr lang="en-US" sz="2310" b="1" dirty="0"/>
             </a:p>
           </p:txBody>
         </p:sp>
@@ -6920,7 +6888,6 @@
                 <a:rPr lang="en-US" sz="2310" b="1" dirty="0"/>
                 <a:t>2</a:t>
               </a:r>
-              <a:endParaRPr lang="en-US" sz="2310" b="1" dirty="0"/>
             </a:p>
           </p:txBody>
         </p:sp>
@@ -6950,7 +6917,6 @@
                 <a:rPr lang="en-US" sz="1980" b="1" dirty="0"/>
                 <a:t>2.1</a:t>
               </a:r>
-              <a:endParaRPr lang="en-US" sz="1980" b="1" dirty="0"/>
             </a:p>
           </p:txBody>
         </p:sp>
@@ -6980,7 +6946,6 @@
                 <a:rPr lang="en-US" sz="1980" b="1" dirty="0"/>
                 <a:t>2.2</a:t>
               </a:r>
-              <a:endParaRPr lang="en-US" sz="1980" b="1" dirty="0"/>
             </a:p>
           </p:txBody>
         </p:sp>
@@ -7010,7 +6975,6 @@
                 <a:rPr lang="en-US" sz="1980" b="1" dirty="0"/>
                 <a:t>2.3</a:t>
               </a:r>
-              <a:endParaRPr lang="en-US" sz="1980" b="1" dirty="0"/>
             </a:p>
           </p:txBody>
         </p:sp>
@@ -7040,7 +7004,6 @@
                 <a:rPr lang="en-US" sz="1485" b="1" dirty="0"/>
                 <a:t>2.1.1</a:t>
               </a:r>
-              <a:endParaRPr lang="en-US" sz="1485" b="1" dirty="0"/>
             </a:p>
           </p:txBody>
         </p:sp>
@@ -7070,7 +7033,6 @@
                 <a:rPr lang="en-US" sz="1485" b="1" dirty="0"/>
                 <a:t>2.1.2</a:t>
               </a:r>
-              <a:endParaRPr lang="en-US" sz="1485" b="1" dirty="0"/>
             </a:p>
           </p:txBody>
         </p:sp>
@@ -7100,7 +7062,6 @@
                 <a:rPr lang="en-US" sz="1485" b="1" dirty="0"/>
                 <a:t>2.1.3</a:t>
               </a:r>
-              <a:endParaRPr lang="en-US" sz="1485" b="1" dirty="0"/>
             </a:p>
           </p:txBody>
         </p:sp>
@@ -7163,7 +7124,6 @@
                 <a:rPr lang="en-US" sz="2310" b="1" dirty="0"/>
                 <a:t>3</a:t>
               </a:r>
-              <a:endParaRPr lang="en-US" sz="2310" b="1" dirty="0"/>
             </a:p>
           </p:txBody>
         </p:sp>
@@ -7193,7 +7153,6 @@
                 <a:rPr lang="en-US" sz="1320" b="1" dirty="0"/>
                 <a:t>3.n.1</a:t>
               </a:r>
-              <a:endParaRPr lang="en-US" sz="1320" b="1" dirty="0"/>
             </a:p>
           </p:txBody>
         </p:sp>
@@ -7223,7 +7182,6 @@
                 <a:rPr lang="en-US" sz="1320" b="1" dirty="0"/>
                 <a:t>3.n.2</a:t>
               </a:r>
-              <a:endParaRPr lang="en-US" sz="1320" b="1" dirty="0"/>
             </a:p>
           </p:txBody>
         </p:sp>
@@ -7253,7 +7211,6 @@
                 <a:rPr lang="en-US" sz="1320" b="1" dirty="0"/>
                 <a:t>3.n.3</a:t>
               </a:r>
-              <a:endParaRPr lang="en-US" sz="1320" b="1" dirty="0"/>
             </a:p>
           </p:txBody>
         </p:sp>
@@ -7283,7 +7240,6 @@
                 <a:rPr lang="en-US" sz="1320" b="1" dirty="0"/>
                 <a:t>3.n.4</a:t>
               </a:r>
-              <a:endParaRPr lang="en-US" sz="1320" b="1" dirty="0"/>
             </a:p>
           </p:txBody>
         </p:sp>
@@ -7313,7 +7269,6 @@
                 <a:rPr lang="en-US" sz="2310" b="1" dirty="0"/>
                 <a:t>4</a:t>
               </a:r>
-              <a:endParaRPr lang="en-US" sz="2310" b="1" dirty="0"/>
             </a:p>
           </p:txBody>
         </p:sp>
@@ -7343,7 +7298,6 @@
                 <a:rPr lang="en-US" sz="1980" b="1" dirty="0"/>
                 <a:t>4.1</a:t>
               </a:r>
-              <a:endParaRPr lang="en-US" sz="1980" b="1" dirty="0"/>
             </a:p>
           </p:txBody>
         </p:sp>
@@ -7373,7 +7327,6 @@
                 <a:rPr lang="en-US" sz="1980" b="1" dirty="0"/>
                 <a:t>4.2</a:t>
               </a:r>
-              <a:endParaRPr lang="en-US" sz="1980" b="1" dirty="0"/>
             </a:p>
           </p:txBody>
         </p:sp>
@@ -7403,7 +7356,6 @@
                 <a:rPr lang="en-US" sz="1485" b="1" dirty="0"/>
                 <a:t>4.2.1</a:t>
               </a:r>
-              <a:endParaRPr lang="en-US" sz="1485" b="1" dirty="0"/>
             </a:p>
           </p:txBody>
         </p:sp>
@@ -7433,7 +7385,6 @@
                 <a:rPr lang="en-US" sz="1980" b="1" dirty="0"/>
                 <a:t>4.1</a:t>
               </a:r>
-              <a:endParaRPr lang="en-US" sz="1980" b="1" dirty="0"/>
             </a:p>
           </p:txBody>
         </p:sp>
@@ -7463,7 +7414,6 @@
                 <a:rPr lang="en-US" sz="1155" b="1" dirty="0"/>
                 <a:t>4.1.2</a:t>
               </a:r>
-              <a:endParaRPr lang="en-US" sz="1155" b="1" dirty="0"/>
             </a:p>
           </p:txBody>
         </p:sp>
@@ -7493,7 +7443,6 @@
                 <a:rPr lang="en-US" sz="1155" b="1" dirty="0"/>
                 <a:t>4.1.3</a:t>
               </a:r>
-              <a:endParaRPr lang="en-US" sz="1155" b="1" dirty="0"/>
             </a:p>
           </p:txBody>
         </p:sp>
@@ -7523,7 +7472,6 @@
                 <a:rPr lang="en-US" sz="2310" b="1" dirty="0"/>
                 <a:t>5</a:t>
               </a:r>
-              <a:endParaRPr lang="en-US" sz="2310" b="1" dirty="0"/>
             </a:p>
           </p:txBody>
         </p:sp>
@@ -7560,14 +7508,6 @@
                 </a:rPr>
                 <a:t>7</a:t>
               </a:r>
-              <a:endParaRPr lang="en-US" sz="2310" b="1" dirty="0">
-                <a:solidFill>
-                  <a:schemeClr val="tx2">
-                    <a:lumMod val="20000"/>
-                    <a:lumOff val="80000"/>
-                  </a:schemeClr>
-                </a:solidFill>
-              </a:endParaRPr>
             </a:p>
           </p:txBody>
         </p:sp>
@@ -7597,7 +7537,6 @@
                 <a:rPr lang="en-US" sz="2310" b="1" dirty="0"/>
                 <a:t>8</a:t>
               </a:r>
-              <a:endParaRPr lang="en-US" sz="2310" b="1" dirty="0"/>
             </a:p>
           </p:txBody>
         </p:sp>
@@ -7627,7 +7566,6 @@
                 <a:rPr lang="en-US" sz="2310" b="1" dirty="0"/>
                 <a:t>9</a:t>
               </a:r>
-              <a:endParaRPr lang="en-US" sz="2310" b="1" dirty="0"/>
             </a:p>
           </p:txBody>
         </p:sp>
@@ -7657,7 +7595,6 @@
                 <a:rPr lang="en-US" sz="2310" b="1" dirty="0"/>
                 <a:t>6</a:t>
               </a:r>
-              <a:endParaRPr lang="en-US" sz="2310" b="1" dirty="0"/>
             </a:p>
           </p:txBody>
         </p:sp>
@@ -7687,7 +7624,6 @@
                 <a:rPr lang="en-US" sz="1980" b="1" dirty="0"/>
                 <a:t>6.1</a:t>
               </a:r>
-              <a:endParaRPr lang="en-US" sz="1980" b="1" dirty="0"/>
             </a:p>
           </p:txBody>
         </p:sp>
@@ -7717,7 +7653,6 @@
                 <a:rPr lang="en-US" sz="1980" b="1" dirty="0"/>
                 <a:t>6.2</a:t>
               </a:r>
-              <a:endParaRPr lang="en-US" sz="1980" b="1" dirty="0"/>
             </a:p>
           </p:txBody>
         </p:sp>
@@ -7747,7 +7682,6 @@
                 <a:rPr lang="en-US" sz="1980" b="1" dirty="0"/>
                 <a:t>6.3</a:t>
               </a:r>
-              <a:endParaRPr lang="en-US" sz="1980" b="1" dirty="0"/>
             </a:p>
           </p:txBody>
         </p:sp>
@@ -7777,7 +7711,6 @@
                 <a:rPr lang="en-US" sz="1980" b="1" dirty="0"/>
                 <a:t>6.4</a:t>
               </a:r>
-              <a:endParaRPr lang="en-US" sz="1980" b="1" dirty="0"/>
             </a:p>
           </p:txBody>
         </p:sp>
@@ -7807,7 +7740,6 @@
                 <a:rPr lang="en-US" sz="1980" b="1" dirty="0"/>
                 <a:t>3.1</a:t>
               </a:r>
-              <a:endParaRPr lang="en-US" sz="1980" b="1" dirty="0"/>
             </a:p>
           </p:txBody>
         </p:sp>
@@ -7837,7 +7769,6 @@
                 <a:rPr lang="en-US" sz="1980" b="1" dirty="0"/>
                 <a:t>3.2</a:t>
               </a:r>
-              <a:endParaRPr lang="en-US" sz="1980" b="1" dirty="0"/>
             </a:p>
           </p:txBody>
         </p:sp>
@@ -7867,7 +7798,6 @@
                 <a:rPr lang="en-US" sz="1980" b="1" dirty="0"/>
                 <a:t>4.1</a:t>
               </a:r>
-              <a:endParaRPr lang="en-US" sz="1980" b="1" dirty="0"/>
             </a:p>
           </p:txBody>
         </p:sp>
@@ -7897,7 +7827,6 @@
                 <a:rPr lang="en-US" sz="1980" b="1" dirty="0"/>
                 <a:t>4.2</a:t>
               </a:r>
-              <a:endParaRPr lang="en-US" sz="1980" b="1" dirty="0"/>
             </a:p>
           </p:txBody>
         </p:sp>
@@ -7960,7 +7889,6 @@
                 <a:rPr lang="en-US" sz="1155" b="1" dirty="0"/>
                 <a:t>4.1.1</a:t>
               </a:r>
-              <a:endParaRPr lang="en-US" sz="1155" b="1" dirty="0"/>
             </a:p>
           </p:txBody>
         </p:sp>
@@ -7990,11 +7918,158 @@
                 <a:rPr lang="en-US" sz="1155" b="1" dirty="0"/>
                 <a:t>4.1.1</a:t>
               </a:r>
-              <a:endParaRPr lang="en-US" sz="1155" b="1" dirty="0"/>
             </a:p>
           </p:txBody>
         </p:sp>
       </p:grpSp>
+      <p:sp>
+        <p:nvSpPr>
+          <p:cNvPr id="3" name="TextBox 2"/>
+          <p:cNvSpPr txBox="1"/>
+          <p:nvPr/>
+        </p:nvSpPr>
+        <p:spPr>
+          <a:xfrm>
+            <a:off x="293387" y="5451768"/>
+            <a:ext cx="9508535" cy="1400383"/>
+          </a:xfrm>
+          <a:prstGeom prst="rect">
+            <a:avLst/>
+          </a:prstGeom>
+          <a:noFill/>
+        </p:spPr>
+        <p:txBody>
+          <a:bodyPr wrap="square" numCol="3" spcCol="274320" rtlCol="0">
+            <a:spAutoFit/>
+          </a:bodyPr>
+          <a:lstStyle/>
+          <a:p>
+            <a:pPr>
+              <a:spcAft>
+                <a:spcPts val="300"/>
+              </a:spcAft>
+            </a:pPr>
+            <a:r>
+              <a:rPr lang="en-US" sz="1050" b="1" dirty="0" smtClean="0"/>
+              <a:t>Geologic scenario:</a:t>
+            </a:r>
+          </a:p>
+          <a:p>
+            <a:pPr>
+              <a:spcAft>
+                <a:spcPts val="300"/>
+              </a:spcAft>
+            </a:pPr>
+            <a:r>
+              <a:rPr lang="en-US" sz="1000" dirty="0" smtClean="0"/>
+              <a:t>Early </a:t>
+            </a:r>
+            <a:r>
+              <a:rPr lang="en-US" sz="1000" dirty="0"/>
+              <a:t>Proterozoic metamorphic </a:t>
+            </a:r>
+            <a:r>
+              <a:rPr lang="en-US" sz="1000" dirty="0" smtClean="0"/>
+              <a:t>rocks are overlain </a:t>
+            </a:r>
+            <a:r>
+              <a:rPr lang="en-US" sz="1000" dirty="0" err="1" smtClean="0"/>
+              <a:t>unconformably</a:t>
+            </a:r>
+            <a:r>
+              <a:rPr lang="en-US" sz="1000" dirty="0" smtClean="0"/>
+              <a:t> by a Cambrian thru Silurian stratigraphic package; Sometime between Silurian and Jurassic, the sequence was tilted and eroded to a near flat surface, on which  </a:t>
+            </a:r>
+            <a:r>
+              <a:rPr lang="en-US" sz="1000" dirty="0"/>
+              <a:t>a Jurassic age sedimentary </a:t>
+            </a:r>
+            <a:r>
+              <a:rPr lang="en-US" sz="1000" dirty="0" smtClean="0"/>
+              <a:t>unit was deposited. That unit </a:t>
+            </a:r>
+            <a:r>
+              <a:rPr lang="en-US" sz="1000" dirty="0"/>
+              <a:t>has a lower clastic part with an internal tuff marker bed, and an upper limestone </a:t>
+            </a:r>
+            <a:r>
+              <a:rPr lang="en-US" sz="1000" dirty="0" smtClean="0"/>
+              <a:t>part; these are not differentiated on the map, but are described as parts of the unit. </a:t>
+            </a:r>
+          </a:p>
+          <a:p>
+            <a:pPr>
+              <a:spcAft>
+                <a:spcPts val="300"/>
+              </a:spcAft>
+            </a:pPr>
+            <a:r>
+              <a:rPr lang="en-US" sz="1000" dirty="0" smtClean="0"/>
+              <a:t>The Jurassic and older rocks are </a:t>
+            </a:r>
+            <a:r>
+              <a:rPr lang="en-US" sz="1000" dirty="0"/>
+              <a:t>intruded by a Cretaceous granite, and </a:t>
+            </a:r>
+            <a:r>
+              <a:rPr lang="en-US" sz="1000" dirty="0" smtClean="0"/>
+              <a:t>by </a:t>
+            </a:r>
+            <a:r>
+              <a:rPr lang="en-US" sz="1000" dirty="0"/>
+              <a:t>a Cretaceous diorite </a:t>
+            </a:r>
+            <a:r>
+              <a:rPr lang="en-US" sz="1000" dirty="0" smtClean="0"/>
+              <a:t>dike</a:t>
+            </a:r>
+            <a:r>
+              <a:rPr lang="en-US" sz="1000" dirty="0"/>
+              <a:t> </a:t>
+            </a:r>
+            <a:r>
+              <a:rPr lang="en-US" sz="1000" dirty="0" smtClean="0"/>
+              <a:t>that also intrudes the Cretaceous granite. A contact metamorphic aureole formed around the Cretaceous granite. The pluton contains extensive internal </a:t>
+            </a:r>
+            <a:r>
+              <a:rPr lang="en-US" sz="1000" dirty="0" err="1" smtClean="0"/>
+              <a:t>schlieren</a:t>
+            </a:r>
+            <a:r>
+              <a:rPr lang="en-US" sz="1000" dirty="0" smtClean="0"/>
+              <a:t> surfaces with concentrations of mafic minerals.</a:t>
+            </a:r>
+          </a:p>
+          <a:p>
+            <a:pPr>
+              <a:spcAft>
+                <a:spcPts val="300"/>
+              </a:spcAft>
+            </a:pPr>
+            <a:r>
+              <a:rPr lang="en-US" sz="1000" dirty="0" smtClean="0"/>
+              <a:t>Another period of </a:t>
+            </a:r>
+            <a:r>
+              <a:rPr lang="en-US" sz="1000" dirty="0" err="1" smtClean="0"/>
+              <a:t>exumation</a:t>
+            </a:r>
+            <a:r>
+              <a:rPr lang="en-US" sz="1000" dirty="0" smtClean="0"/>
+              <a:t> and erosion removed the units that overlay the Jurassic sedimentary unit when the granite was intruded, producing an erosion surface on the Jurassic sedimentary unit </a:t>
+            </a:r>
+            <a:r>
+              <a:rPr lang="en-US" sz="1000" smtClean="0"/>
+              <a:t>and Cretaceous </a:t>
+            </a:r>
+            <a:r>
+              <a:rPr lang="en-US" sz="1000" dirty="0" smtClean="0"/>
+              <a:t>igneous rocks. Late Miocene sediment buried this surface, and after a period of non deposition in the Pliocene and Pleistocene, Holocene sediment blanketed the Miocene sediment.</a:t>
+            </a:r>
+            <a:endParaRPr lang="en-US" sz="1000" dirty="0"/>
+          </a:p>
+        </p:txBody>
+      </p:sp>
     </p:spTree>
     <p:extLst>
       <p:ext uri="{BB962C8B-B14F-4D97-AF65-F5344CB8AC3E}">

</xml_diff>